<commit_message>
[DOCS] : Add today meeting document
</commit_message>
<xml_diff>
--- a/document/Project_proposal_1조.pptx
+++ b/document/Project_proposal_1조.pptx
@@ -2790,66 +2790,6 @@
       </p:sp>
       <p:sp>
         <p:nvSpPr>
-          <p:cNvPr id="9" name="직사각형 8"/>
-          <p:cNvSpPr/>
-          <p:nvPr/>
-        </p:nvSpPr>
-        <p:spPr>
-          <a:xfrm>
-            <a:off x="2602537" y="122047"/>
-            <a:ext cx="8011218" cy="523220"/>
-          </a:xfrm>
-          <a:prstGeom prst="rect">
-            <a:avLst/>
-          </a:prstGeom>
-        </p:spPr>
-        <p:txBody>
-          <a:bodyPr wrap="square">
-            <a:spAutoFit/>
-          </a:bodyPr>
-          <a:lstStyle/>
-          <a:p>
-            <a:pPr>
-              <a:spcBef>
-                <a:spcPts val="1000"/>
-              </a:spcBef>
-            </a:pPr>
-            <a:r>
-              <a:rPr lang="ko-KR" altLang="en-US" sz="2800" spc="-150" dirty="0">
-                <a:ln>
-                  <a:solidFill>
-                    <a:schemeClr val="accent1">
-                      <a:alpha val="0"/>
-                    </a:schemeClr>
-                  </a:solidFill>
-                </a:ln>
-                <a:solidFill>
-                  <a:srgbClr val="282421"/>
-                </a:solidFill>
-                <a:latin typeface="배달의민족 도현" panose="020B0600000101010101" pitchFamily="50" charset="-127"/>
-                <a:ea typeface="배달의민족 도현" panose="020B0600000101010101" pitchFamily="50" charset="-127"/>
-              </a:rPr>
-              <a:t>서비스 구조</a:t>
-            </a:r>
-            <a:endParaRPr lang="en-US" altLang="ko-KR" sz="2800" spc="-150" dirty="0">
-              <a:ln>
-                <a:solidFill>
-                  <a:schemeClr val="accent1">
-                    <a:alpha val="0"/>
-                  </a:schemeClr>
-                </a:solidFill>
-              </a:ln>
-              <a:solidFill>
-                <a:srgbClr val="282421"/>
-              </a:solidFill>
-              <a:latin typeface="배달의민족 도현" panose="020B0600000101010101" pitchFamily="50" charset="-127"/>
-              <a:ea typeface="배달의민족 도현" panose="020B0600000101010101" pitchFamily="50" charset="-127"/>
-            </a:endParaRPr>
-          </a:p>
-        </p:txBody>
-      </p:sp>
-      <p:sp>
-        <p:nvSpPr>
           <p:cNvPr id="18" name="사각형: 둥근 모서리 17">
             <a:extLst>
               <a:ext uri="{FF2B5EF4-FFF2-40B4-BE49-F238E27FC236}">
@@ -2862,8 +2802,8 @@
         </p:nvSpPr>
         <p:spPr>
           <a:xfrm>
-            <a:off x="8058887" y="2080968"/>
-            <a:ext cx="3487803" cy="3286103"/>
+            <a:off x="8058887" y="1280160"/>
+            <a:ext cx="3487803" cy="4287520"/>
           </a:xfrm>
           <a:prstGeom prst="roundRect">
             <a:avLst/>
@@ -2914,7 +2854,7 @@
         </p:nvSpPr>
         <p:spPr>
           <a:xfrm>
-            <a:off x="9124116" y="2314663"/>
+            <a:off x="9124116" y="1457647"/>
             <a:ext cx="1357344" cy="523220"/>
           </a:xfrm>
           <a:prstGeom prst="rect">
@@ -3200,7 +3140,7 @@
         </p:nvSpPr>
         <p:spPr>
           <a:xfrm>
-            <a:off x="3057942" y="5240298"/>
+            <a:off x="3021480" y="5155332"/>
             <a:ext cx="2453956" cy="1203234"/>
           </a:xfrm>
           <a:prstGeom prst="ellipse">
@@ -3294,7 +3234,7 @@
         </p:nvSpPr>
         <p:spPr>
           <a:xfrm>
-            <a:off x="8575810" y="3162811"/>
+            <a:off x="8631004" y="2801663"/>
             <a:ext cx="2468110" cy="1203234"/>
           </a:xfrm>
           <a:prstGeom prst="ellipse">
@@ -3338,7 +3278,7 @@
                 <a:latin typeface="나눔바른고딕" panose="020B0603020101020101" pitchFamily="50" charset="-127"/>
                 <a:ea typeface="나눔바른고딕" panose="020B0603020101020101" pitchFamily="50" charset="-127"/>
               </a:rPr>
-              <a:t>서버에 노점 정보</a:t>
+              <a:t>노점 정보</a:t>
             </a:r>
             <a:endParaRPr lang="en-US" altLang="ko-KR" dirty="0">
               <a:solidFill>
@@ -3358,7 +3298,7 @@
                 <a:latin typeface="나눔바른고딕" panose="020B0603020101020101" pitchFamily="50" charset="-127"/>
                 <a:ea typeface="나눔바른고딕" panose="020B0603020101020101" pitchFamily="50" charset="-127"/>
               </a:rPr>
-              <a:t>등록</a:t>
+              <a:t>등록 및 관리</a:t>
             </a:r>
             <a:endParaRPr lang="en-US" altLang="ko-KR" dirty="0">
               <a:solidFill>
@@ -3375,15 +3315,15 @@
           <p:cNvPr id="13" name="직선 화살표 연결선 12"/>
           <p:cNvCxnSpPr>
             <a:cxnSpLocks/>
-            <a:stCxn id="10" idx="6"/>
-            <a:endCxn id="31" idx="2"/>
+            <a:stCxn id="8" idx="3"/>
+            <a:endCxn id="18" idx="1"/>
           </p:cNvCxnSpPr>
           <p:nvPr/>
         </p:nvCxnSpPr>
         <p:spPr>
           <a:xfrm>
-            <a:off x="5481548" y="3211219"/>
-            <a:ext cx="3094262" cy="553209"/>
+            <a:off x="6074442" y="2837883"/>
+            <a:ext cx="1984445" cy="586037"/>
           </a:xfrm>
           <a:prstGeom prst="straightConnector1">
             <a:avLst/>
@@ -3415,15 +3355,15 @@
           <p:cNvPr id="35" name="직선 화살표 연결선 34"/>
           <p:cNvCxnSpPr>
             <a:cxnSpLocks/>
-            <a:stCxn id="30" idx="6"/>
-            <a:endCxn id="31" idx="2"/>
+            <a:stCxn id="24" idx="3"/>
+            <a:endCxn id="18" idx="1"/>
           </p:cNvCxnSpPr>
           <p:nvPr/>
         </p:nvCxnSpPr>
         <p:spPr>
           <a:xfrm flipV="1">
-            <a:off x="5511898" y="3764428"/>
-            <a:ext cx="3063912" cy="2077487"/>
+            <a:off x="6048588" y="3423920"/>
+            <a:ext cx="2010299" cy="1943152"/>
           </a:xfrm>
           <a:prstGeom prst="straightConnector1">
             <a:avLst/>
@@ -4036,8 +3976,8 @@
         </p:nvSpPr>
         <p:spPr>
           <a:xfrm>
-            <a:off x="2268454" y="904242"/>
-            <a:ext cx="4147901" cy="5823604"/>
+            <a:off x="2268454" y="182882"/>
+            <a:ext cx="4147901" cy="6544964"/>
           </a:xfrm>
           <a:prstGeom prst="roundRect">
             <a:avLst/>
@@ -4088,7 +4028,7 @@
         </p:nvSpPr>
         <p:spPr>
           <a:xfrm>
-            <a:off x="3738668" y="981292"/>
+            <a:off x="2762405" y="634871"/>
             <a:ext cx="1121628" cy="523220"/>
           </a:xfrm>
           <a:prstGeom prst="rect">
@@ -4123,6 +4063,190 @@
               </a:rPr>
               <a:t>client</a:t>
             </a:r>
+          </a:p>
+        </p:txBody>
+      </p:sp>
+      <p:pic>
+        <p:nvPicPr>
+          <p:cNvPr id="2050" name="Picture 2" descr="안드로이드 아키텍처 패턴 - MVC가 뭘까?">
+            <a:extLst>
+              <a:ext uri="{FF2B5EF4-FFF2-40B4-BE49-F238E27FC236}">
+                <a16:creationId xmlns:a16="http://schemas.microsoft.com/office/drawing/2014/main" id="{665219C0-6310-4EAD-A0BE-0224A05203B8}"/>
+              </a:ext>
+            </a:extLst>
+          </p:cNvPr>
+          <p:cNvPicPr>
+            <a:picLocks noChangeAspect="1" noChangeArrowheads="1"/>
+          </p:cNvPicPr>
+          <p:nvPr/>
+        </p:nvPicPr>
+        <p:blipFill>
+          <a:blip r:embed="rId4" cstate="print">
+            <a:extLst>
+              <a:ext uri="{28A0092B-C50C-407E-A947-70E740481C1C}">
+                <a14:useLocalDpi xmlns:a14="http://schemas.microsoft.com/office/drawing/2010/main" val="0"/>
+              </a:ext>
+            </a:extLst>
+          </a:blip>
+          <a:srcRect/>
+          <a:stretch>
+            <a:fillRect/>
+          </a:stretch>
+        </p:blipFill>
+        <p:spPr bwMode="auto">
+          <a:xfrm>
+            <a:off x="3948374" y="308694"/>
+            <a:ext cx="2001775" cy="1332431"/>
+          </a:xfrm>
+          <a:prstGeom prst="rect">
+            <a:avLst/>
+          </a:prstGeom>
+          <a:noFill/>
+          <a:extLst>
+            <a:ext uri="{909E8E84-426E-40DD-AFC4-6F175D3DCCD1}">
+              <a14:hiddenFill xmlns:a14="http://schemas.microsoft.com/office/drawing/2010/main">
+                <a:solidFill>
+                  <a:srgbClr val="FFFFFF"/>
+                </a:solidFill>
+              </a14:hiddenFill>
+            </a:ext>
+          </a:extLst>
+        </p:spPr>
+      </p:pic>
+      <p:pic>
+        <p:nvPicPr>
+          <p:cNvPr id="2052" name="Picture 4" descr="파이어베이스 - 위키백과, 우리 모두의 백과사전">
+            <a:extLst>
+              <a:ext uri="{FF2B5EF4-FFF2-40B4-BE49-F238E27FC236}">
+                <a16:creationId xmlns:a16="http://schemas.microsoft.com/office/drawing/2014/main" id="{7500EAB8-6A3E-4A0E-BFB6-57E57437439A}"/>
+              </a:ext>
+            </a:extLst>
+          </p:cNvPr>
+          <p:cNvPicPr>
+            <a:picLocks noChangeAspect="1" noChangeArrowheads="1"/>
+          </p:cNvPicPr>
+          <p:nvPr/>
+        </p:nvPicPr>
+        <p:blipFill>
+          <a:blip r:embed="rId5" cstate="print">
+            <a:extLst>
+              <a:ext uri="{28A0092B-C50C-407E-A947-70E740481C1C}">
+                <a14:useLocalDpi xmlns:a14="http://schemas.microsoft.com/office/drawing/2010/main" val="0"/>
+              </a:ext>
+            </a:extLst>
+          </a:blip>
+          <a:srcRect/>
+          <a:stretch>
+            <a:fillRect/>
+          </a:stretch>
+        </p:blipFill>
+        <p:spPr bwMode="auto">
+          <a:xfrm>
+            <a:off x="8518221" y="1935779"/>
+            <a:ext cx="2518935" cy="865884"/>
+          </a:xfrm>
+          <a:prstGeom prst="rect">
+            <a:avLst/>
+          </a:prstGeom>
+          <a:noFill/>
+          <a:extLst>
+            <a:ext uri="{909E8E84-426E-40DD-AFC4-6F175D3DCCD1}">
+              <a14:hiddenFill xmlns:a14="http://schemas.microsoft.com/office/drawing/2010/main">
+                <a:solidFill>
+                  <a:srgbClr val="FFFFFF"/>
+                </a:solidFill>
+              </a14:hiddenFill>
+            </a:ext>
+          </a:extLst>
+        </p:spPr>
+      </p:pic>
+      <p:sp>
+        <p:nvSpPr>
+          <p:cNvPr id="37" name="타원 36">
+            <a:extLst>
+              <a:ext uri="{FF2B5EF4-FFF2-40B4-BE49-F238E27FC236}">
+                <a16:creationId xmlns:a16="http://schemas.microsoft.com/office/drawing/2014/main" id="{B5FDF1F8-5F2F-4BAE-A8C7-6B29FD6EDCAC}"/>
+              </a:ext>
+            </a:extLst>
+          </p:cNvPr>
+          <p:cNvSpPr/>
+          <p:nvPr/>
+        </p:nvSpPr>
+        <p:spPr>
+          <a:xfrm>
+            <a:off x="8529928" y="4170485"/>
+            <a:ext cx="2787236" cy="1203234"/>
+          </a:xfrm>
+          <a:prstGeom prst="ellipse">
+            <a:avLst/>
+          </a:prstGeom>
+          <a:solidFill>
+            <a:schemeClr val="bg1"/>
+          </a:solidFill>
+          <a:ln w="28575">
+            <a:solidFill>
+              <a:schemeClr val="tx1"/>
+            </a:solidFill>
+          </a:ln>
+        </p:spPr>
+        <p:style>
+          <a:lnRef idx="2">
+            <a:schemeClr val="accent1">
+              <a:shade val="50000"/>
+            </a:schemeClr>
+          </a:lnRef>
+          <a:fillRef idx="1">
+            <a:schemeClr val="accent1"/>
+          </a:fillRef>
+          <a:effectRef idx="0">
+            <a:schemeClr val="accent1"/>
+          </a:effectRef>
+          <a:fontRef idx="minor">
+            <a:schemeClr val="lt1"/>
+          </a:fontRef>
+        </p:style>
+        <p:txBody>
+          <a:bodyPr rtlCol="0" anchor="ctr"/>
+          <a:lstStyle/>
+          <a:p>
+            <a:pPr algn="ctr"/>
+            <a:r>
+              <a:rPr lang="ko-KR" altLang="en-US" dirty="0">
+                <a:solidFill>
+                  <a:schemeClr val="tx1"/>
+                </a:solidFill>
+                <a:latin typeface="나눔바른고딕" panose="020B0603020101020101" pitchFamily="50" charset="-127"/>
+                <a:ea typeface="나눔바른고딕" panose="020B0603020101020101" pitchFamily="50" charset="-127"/>
+              </a:rPr>
+              <a:t>사용자 정보</a:t>
+            </a:r>
+            <a:endParaRPr lang="en-US" altLang="ko-KR" dirty="0">
+              <a:solidFill>
+                <a:schemeClr val="tx1"/>
+              </a:solidFill>
+              <a:latin typeface="나눔바른고딕" panose="020B0603020101020101" pitchFamily="50" charset="-127"/>
+              <a:ea typeface="나눔바른고딕" panose="020B0603020101020101" pitchFamily="50" charset="-127"/>
+            </a:endParaRPr>
+          </a:p>
+          <a:p>
+            <a:pPr algn="ctr"/>
+            <a:r>
+              <a:rPr lang="ko-KR" altLang="en-US" dirty="0">
+                <a:solidFill>
+                  <a:schemeClr val="tx1"/>
+                </a:solidFill>
+                <a:latin typeface="나눔바른고딕" panose="020B0603020101020101" pitchFamily="50" charset="-127"/>
+                <a:ea typeface="나눔바른고딕" panose="020B0603020101020101" pitchFamily="50" charset="-127"/>
+              </a:rPr>
+              <a:t>등록 및 관리</a:t>
+            </a:r>
+            <a:endParaRPr lang="en-US" altLang="ko-KR" dirty="0">
+              <a:solidFill>
+                <a:schemeClr val="tx1"/>
+              </a:solidFill>
+              <a:latin typeface="나눔바른고딕" panose="020B0603020101020101" pitchFamily="50" charset="-127"/>
+              <a:ea typeface="나눔바른고딕" panose="020B0603020101020101" pitchFamily="50" charset="-127"/>
+            </a:endParaRPr>
           </a:p>
         </p:txBody>
       </p:sp>
@@ -4557,7 +4681,7 @@
         </p:nvSpPr>
         <p:spPr>
           <a:xfrm>
-            <a:off x="6751058" y="1639966"/>
+            <a:off x="6751058" y="1721246"/>
             <a:ext cx="3621974" cy="3783087"/>
           </a:xfrm>
           <a:prstGeom prst="rect">
@@ -7148,7 +7272,7 @@
         </p:blipFill>
         <p:spPr bwMode="auto">
           <a:xfrm>
-            <a:off x="8746047" y="2799988"/>
+            <a:off x="8671516" y="3661690"/>
             <a:ext cx="1614488" cy="1824038"/>
           </a:xfrm>
           <a:prstGeom prst="rect">
@@ -7188,7 +7312,7 @@
         </p:blipFill>
         <p:spPr>
           <a:xfrm>
-            <a:off x="3445954" y="2115185"/>
+            <a:off x="2928319" y="2064868"/>
             <a:ext cx="3193644" cy="3193644"/>
           </a:xfrm>
           <a:prstGeom prst="rect">
@@ -7538,6 +7662,147 @@
           </a:p>
         </p:txBody>
       </p:sp>
+      <p:pic>
+        <p:nvPicPr>
+          <p:cNvPr id="1026" name="Picture 2" descr="Where free icon">
+            <a:extLst>
+              <a:ext uri="{FF2B5EF4-FFF2-40B4-BE49-F238E27FC236}">
+                <a16:creationId xmlns:a16="http://schemas.microsoft.com/office/drawing/2014/main" id="{9D84EAA5-2E57-4A44-98EC-0D52F15376D2}"/>
+              </a:ext>
+            </a:extLst>
+          </p:cNvPr>
+          <p:cNvPicPr>
+            <a:picLocks noChangeAspect="1" noChangeArrowheads="1"/>
+          </p:cNvPicPr>
+          <p:nvPr/>
+        </p:nvPicPr>
+        <p:blipFill>
+          <a:blip r:embed="rId6" cstate="print">
+            <a:extLst>
+              <a:ext uri="{28A0092B-C50C-407E-A947-70E740481C1C}">
+                <a14:useLocalDpi xmlns:a14="http://schemas.microsoft.com/office/drawing/2010/main" val="0"/>
+              </a:ext>
+            </a:extLst>
+          </a:blip>
+          <a:srcRect/>
+          <a:stretch>
+            <a:fillRect/>
+          </a:stretch>
+        </p:blipFill>
+        <p:spPr bwMode="auto">
+          <a:xfrm>
+            <a:off x="9861569" y="2097519"/>
+            <a:ext cx="1614488" cy="1614488"/>
+          </a:xfrm>
+          <a:prstGeom prst="rect">
+            <a:avLst/>
+          </a:prstGeom>
+          <a:noFill/>
+          <a:extLst>
+            <a:ext uri="{909E8E84-426E-40DD-AFC4-6F175D3DCCD1}">
+              <a14:hiddenFill xmlns:a14="http://schemas.microsoft.com/office/drawing/2010/main">
+                <a:solidFill>
+                  <a:srgbClr val="FFFFFF"/>
+                </a:solidFill>
+              </a14:hiddenFill>
+            </a:ext>
+          </a:extLst>
+        </p:spPr>
+      </p:pic>
+      <p:pic>
+        <p:nvPicPr>
+          <p:cNvPr id="1028" name="Picture 4" descr="Deadline free icon">
+            <a:extLst>
+              <a:ext uri="{FF2B5EF4-FFF2-40B4-BE49-F238E27FC236}">
+                <a16:creationId xmlns:a16="http://schemas.microsoft.com/office/drawing/2014/main" id="{4601E6E0-6D85-4641-9CAE-AD7C35A39782}"/>
+              </a:ext>
+            </a:extLst>
+          </p:cNvPr>
+          <p:cNvPicPr>
+            <a:picLocks noChangeAspect="1" noChangeArrowheads="1"/>
+          </p:cNvPicPr>
+          <p:nvPr/>
+        </p:nvPicPr>
+        <p:blipFill>
+          <a:blip r:embed="rId7" cstate="print">
+            <a:extLst>
+              <a:ext uri="{28A0092B-C50C-407E-A947-70E740481C1C}">
+                <a14:useLocalDpi xmlns:a14="http://schemas.microsoft.com/office/drawing/2010/main" val="0"/>
+              </a:ext>
+            </a:extLst>
+          </a:blip>
+          <a:srcRect/>
+          <a:stretch>
+            <a:fillRect/>
+          </a:stretch>
+        </p:blipFill>
+        <p:spPr bwMode="auto">
+          <a:xfrm>
+            <a:off x="7685382" y="1999796"/>
+            <a:ext cx="1471627" cy="1471627"/>
+          </a:xfrm>
+          <a:prstGeom prst="rect">
+            <a:avLst/>
+          </a:prstGeom>
+          <a:noFill/>
+          <a:extLst>
+            <a:ext uri="{909E8E84-426E-40DD-AFC4-6F175D3DCCD1}">
+              <a14:hiddenFill xmlns:a14="http://schemas.microsoft.com/office/drawing/2010/main">
+                <a:solidFill>
+                  <a:srgbClr val="FFFFFF"/>
+                </a:solidFill>
+              </a14:hiddenFill>
+            </a:ext>
+          </a:extLst>
+        </p:spPr>
+      </p:pic>
+      <p:pic>
+        <p:nvPicPr>
+          <p:cNvPr id="1030" name="Picture 6" descr="Bubble chat free icon">
+            <a:extLst>
+              <a:ext uri="{FF2B5EF4-FFF2-40B4-BE49-F238E27FC236}">
+                <a16:creationId xmlns:a16="http://schemas.microsoft.com/office/drawing/2014/main" id="{D108E92A-93AE-4A06-A773-D408C64C1A93}"/>
+              </a:ext>
+            </a:extLst>
+          </p:cNvPr>
+          <p:cNvPicPr>
+            <a:picLocks noChangeAspect="1" noChangeArrowheads="1"/>
+          </p:cNvPicPr>
+          <p:nvPr/>
+        </p:nvPicPr>
+        <p:blipFill>
+          <a:blip r:embed="rId8">
+            <a:extLst>
+              <a:ext uri="{28A0092B-C50C-407E-A947-70E740481C1C}">
+                <a14:useLocalDpi xmlns:a14="http://schemas.microsoft.com/office/drawing/2010/main" val="0"/>
+              </a:ext>
+            </a:extLst>
+          </a:blip>
+          <a:srcRect/>
+          <a:stretch>
+            <a:fillRect/>
+          </a:stretch>
+        </p:blipFill>
+        <p:spPr bwMode="auto">
+          <a:xfrm>
+            <a:off x="7159712" y="1719598"/>
+            <a:ext cx="2397717" cy="2397717"/>
+          </a:xfrm>
+          <a:prstGeom prst="rect">
+            <a:avLst/>
+          </a:prstGeom>
+          <a:noFill/>
+          <a:extLst>
+            <a:ext uri="{909E8E84-426E-40DD-AFC4-6F175D3DCCD1}">
+              <a14:hiddenFill xmlns:a14="http://schemas.microsoft.com/office/drawing/2010/main">
+                <a:solidFill>
+                  <a:srgbClr val="FFFFFF"/>
+                </a:solidFill>
+              </a14:hiddenFill>
+            </a:ext>
+          </a:extLst>
+        </p:spPr>
+      </p:pic>
     </p:spTree>
     <p:extLst>
       <p:ext uri="{BB962C8B-B14F-4D97-AF65-F5344CB8AC3E}">
@@ -7881,8 +8146,8 @@
         </p:nvSpPr>
         <p:spPr>
           <a:xfrm>
-            <a:off x="3587851" y="5117068"/>
-            <a:ext cx="2234997" cy="369332"/>
+            <a:off x="3451275" y="5065013"/>
+            <a:ext cx="2508149" cy="400110"/>
           </a:xfrm>
           <a:prstGeom prst="rect">
             <a:avLst/>
@@ -7896,7 +8161,7 @@
           <a:lstStyle/>
           <a:p>
             <a:r>
-              <a:rPr lang="ko-KR" altLang="en-US" dirty="0">
+              <a:rPr lang="ko-KR" altLang="en-US" sz="2000" dirty="0">
                 <a:latin typeface="나눔바른고딕" panose="020B0603020101020101" pitchFamily="50" charset="-127"/>
                 <a:ea typeface="나눔바른고딕" panose="020B0603020101020101" pitchFamily="50" charset="-127"/>
               </a:rPr>
@@ -8990,7 +9255,7 @@
                 <a:latin typeface="나눔바른고딕" panose="020B0603020101020101" pitchFamily="50" charset="-127"/>
                 <a:ea typeface="나눔바른고딕" panose="020B0603020101020101" pitchFamily="50" charset="-127"/>
               </a:rPr>
-              <a:t>노점 상인은 어플리케이션에 위치를 등록</a:t>
+              <a:t>노점 상인은 어플리케이션에 위치를 등록 가능</a:t>
             </a:r>
             <a:endParaRPr lang="en-US" altLang="ko-KR" sz="3200" dirty="0">
               <a:latin typeface="나눔바른고딕" panose="020B0603020101020101" pitchFamily="50" charset="-127"/>
@@ -9009,7 +9274,7 @@
                 <a:latin typeface="나눔바른고딕" panose="020B0603020101020101" pitchFamily="50" charset="-127"/>
                 <a:ea typeface="나눔바른고딕" panose="020B0603020101020101" pitchFamily="50" charset="-127"/>
               </a:rPr>
-              <a:t>소비자는 원하는 노점 확인 및 즐겨 찾기 등록 가능</a:t>
+              <a:t>소비자는 원하는 노점 확인 및 북마크 등록 가능</a:t>
             </a:r>
             <a:endParaRPr lang="en-US" altLang="ko-KR" sz="3200" dirty="0">
               <a:latin typeface="나눔바른고딕" panose="020B0603020101020101" pitchFamily="50" charset="-127"/>
@@ -9511,23 +9776,20 @@
               </a:rPr>
               <a:t>노점상인은 자신의 위치를 어플리케이션에 등록</a:t>
             </a:r>
-            <a:r>
-              <a:rPr lang="en-US" altLang="ko-KR" sz="2800" spc="-150" dirty="0">
-                <a:ln>
-                  <a:solidFill>
-                    <a:schemeClr val="accent1">
-                      <a:alpha val="0"/>
-                    </a:schemeClr>
-                  </a:solidFill>
-                </a:ln>
-                <a:solidFill>
-                  <a:srgbClr val="282421"/>
-                </a:solidFill>
-                <a:latin typeface="배달의민족 도현" panose="020B0600000101010101" pitchFamily="50" charset="-127"/>
-                <a:ea typeface="배달의민족 도현" panose="020B0600000101010101" pitchFamily="50" charset="-127"/>
-              </a:rPr>
-              <a:t>.</a:t>
-            </a:r>
+            <a:endParaRPr lang="en-US" altLang="ko-KR" sz="2800" spc="-150" dirty="0">
+              <a:ln>
+                <a:solidFill>
+                  <a:schemeClr val="accent1">
+                    <a:alpha val="0"/>
+                  </a:schemeClr>
+                </a:solidFill>
+              </a:ln>
+              <a:solidFill>
+                <a:srgbClr val="282421"/>
+              </a:solidFill>
+              <a:latin typeface="배달의민족 도현" panose="020B0600000101010101" pitchFamily="50" charset="-127"/>
+              <a:ea typeface="배달의민족 도현" panose="020B0600000101010101" pitchFamily="50" charset="-127"/>
+            </a:endParaRPr>
           </a:p>
         </p:txBody>
       </p:sp>
@@ -10183,7 +10445,7 @@
         </p:blipFill>
         <p:spPr bwMode="auto">
           <a:xfrm>
-            <a:off x="8105303" y="1526862"/>
+            <a:off x="8257703" y="1526862"/>
             <a:ext cx="2600960" cy="2600960"/>
           </a:xfrm>
           <a:prstGeom prst="rect">
@@ -10212,13 +10474,14 @@
           </p:cNvPr>
           <p:cNvCxnSpPr>
             <a:cxnSpLocks/>
+            <a:stCxn id="13" idx="1"/>
           </p:cNvCxnSpPr>
           <p:nvPr/>
         </p:nvCxnSpPr>
         <p:spPr>
           <a:xfrm flipH="1" flipV="1">
             <a:off x="4921091" y="3180080"/>
-            <a:ext cx="3184212" cy="640080"/>
+            <a:ext cx="3137796" cy="477520"/>
           </a:xfrm>
           <a:prstGeom prst="straightConnector1">
             <a:avLst/>
@@ -10274,7 +10537,7 @@
         </p:blipFill>
         <p:spPr bwMode="auto">
           <a:xfrm>
-            <a:off x="8477332" y="3683000"/>
+            <a:off x="8529573" y="3511711"/>
             <a:ext cx="1981200" cy="1981200"/>
           </a:xfrm>
           <a:prstGeom prst="rect">
@@ -10292,6 +10555,58 @@
           </a:extLst>
         </p:spPr>
       </p:pic>
+      <p:sp>
+        <p:nvSpPr>
+          <p:cNvPr id="13" name="사각형: 둥근 모서리 12">
+            <a:extLst>
+              <a:ext uri="{FF2B5EF4-FFF2-40B4-BE49-F238E27FC236}">
+                <a16:creationId xmlns:a16="http://schemas.microsoft.com/office/drawing/2014/main" id="{3E42BBD5-D74F-4DD2-AB22-6636955548B5}"/>
+              </a:ext>
+            </a:extLst>
+          </p:cNvPr>
+          <p:cNvSpPr/>
+          <p:nvPr/>
+        </p:nvSpPr>
+        <p:spPr>
+          <a:xfrm>
+            <a:off x="8058887" y="1747520"/>
+            <a:ext cx="2893593" cy="3820160"/>
+          </a:xfrm>
+          <a:prstGeom prst="roundRect">
+            <a:avLst/>
+          </a:prstGeom>
+          <a:noFill/>
+          <a:ln w="50800">
+            <a:solidFill>
+              <a:schemeClr val="tx1"/>
+            </a:solidFill>
+          </a:ln>
+        </p:spPr>
+        <p:style>
+          <a:lnRef idx="2">
+            <a:schemeClr val="accent1">
+              <a:shade val="50000"/>
+            </a:schemeClr>
+          </a:lnRef>
+          <a:fillRef idx="1">
+            <a:schemeClr val="accent1"/>
+          </a:fillRef>
+          <a:effectRef idx="0">
+            <a:schemeClr val="accent1"/>
+          </a:effectRef>
+          <a:fontRef idx="minor">
+            <a:schemeClr val="lt1"/>
+          </a:fontRef>
+        </p:style>
+        <p:txBody>
+          <a:bodyPr rtlCol="0" anchor="ctr"/>
+          <a:lstStyle/>
+          <a:p>
+            <a:pPr algn="ctr"/>
+            <a:endParaRPr lang="ko-KR" altLang="en-US"/>
+          </a:p>
+        </p:txBody>
+      </p:sp>
     </p:spTree>
     <p:extLst>
       <p:ext uri="{BB962C8B-B14F-4D97-AF65-F5344CB8AC3E}">
@@ -10497,7 +10812,75 @@
                 <a:latin typeface="배달의민족 도현" panose="020B0600000101010101" pitchFamily="50" charset="-127"/>
                 <a:ea typeface="배달의민족 도현" panose="020B0600000101010101" pitchFamily="50" charset="-127"/>
               </a:rPr>
-              <a:t> 소비자는 위치 확인 및 즐겨 찾기 가능</a:t>
+              <a:t> 소비자는 위치 확인 및 북마크</a:t>
+            </a:r>
+            <a:r>
+              <a:rPr lang="en-US" altLang="ko-KR" sz="2800" spc="-150" dirty="0">
+                <a:ln>
+                  <a:solidFill>
+                    <a:schemeClr val="accent1">
+                      <a:alpha val="0"/>
+                    </a:schemeClr>
+                  </a:solidFill>
+                </a:ln>
+                <a:solidFill>
+                  <a:srgbClr val="282421"/>
+                </a:solidFill>
+                <a:latin typeface="배달의민족 도현" panose="020B0600000101010101" pitchFamily="50" charset="-127"/>
+                <a:ea typeface="배달의민족 도현" panose="020B0600000101010101" pitchFamily="50" charset="-127"/>
+              </a:rPr>
+              <a:t>, </a:t>
+            </a:r>
+            <a:r>
+              <a:rPr lang="ko-KR" altLang="en-US" sz="2800" spc="-150" dirty="0">
+                <a:ln>
+                  <a:solidFill>
+                    <a:schemeClr val="accent1">
+                      <a:alpha val="0"/>
+                    </a:schemeClr>
+                  </a:solidFill>
+                </a:ln>
+                <a:solidFill>
+                  <a:srgbClr val="282421"/>
+                </a:solidFill>
+                <a:latin typeface="배달의민족 도현" panose="020B0600000101010101" pitchFamily="50" charset="-127"/>
+                <a:ea typeface="배달의민족 도현" panose="020B0600000101010101" pitchFamily="50" charset="-127"/>
+              </a:rPr>
+              <a:t>리뷰</a:t>
+            </a:r>
+            <a:r>
+              <a:rPr lang="en-US" altLang="ko-KR" sz="2800" spc="-150" dirty="0">
+                <a:ln>
+                  <a:solidFill>
+                    <a:schemeClr val="accent1">
+                      <a:alpha val="0"/>
+                    </a:schemeClr>
+                  </a:solidFill>
+                </a:ln>
+                <a:solidFill>
+                  <a:srgbClr val="282421"/>
+                </a:solidFill>
+                <a:latin typeface="배달의민족 도현" panose="020B0600000101010101" pitchFamily="50" charset="-127"/>
+                <a:ea typeface="배달의민족 도현" panose="020B0600000101010101" pitchFamily="50" charset="-127"/>
+              </a:rPr>
+              <a:t> </a:t>
+            </a:r>
+            <a:r>
+              <a:rPr lang="ko-KR" altLang="en-US" sz="2800" spc="-150" dirty="0">
+                <a:ln>
+                  <a:solidFill>
+                    <a:schemeClr val="accent1">
+                      <a:alpha val="0"/>
+                    </a:schemeClr>
+                  </a:solidFill>
+                </a:ln>
+                <a:solidFill>
+                  <a:srgbClr val="282421"/>
+                </a:solidFill>
+                <a:latin typeface="배달의민족 도현" panose="020B0600000101010101" pitchFamily="50" charset="-127"/>
+                <a:ea typeface="배달의민족 도현" panose="020B0600000101010101" pitchFamily="50" charset="-127"/>
+              </a:rPr>
+              <a:t>가능</a:t>
             </a:r>
             <a:endParaRPr lang="en-US" altLang="ko-KR" sz="2800" spc="-150" dirty="0">
               <a:ln>
@@ -10568,7 +10951,7 @@
         </p:blipFill>
         <p:spPr>
           <a:xfrm>
-            <a:off x="6557255" y="2886574"/>
+            <a:off x="6603397" y="2107473"/>
             <a:ext cx="1571320" cy="1571320"/>
           </a:xfrm>
           <a:prstGeom prst="rect">
@@ -10598,7 +10981,7 @@
         </p:blipFill>
         <p:spPr>
           <a:xfrm>
-            <a:off x="8563465" y="2075412"/>
+            <a:off x="8597989" y="2075412"/>
             <a:ext cx="3193644" cy="3193644"/>
           </a:xfrm>
           <a:prstGeom prst="rect">
@@ -11242,6 +11625,53 @@
           </a:p>
         </p:txBody>
       </p:sp>
+      <p:pic>
+        <p:nvPicPr>
+          <p:cNvPr id="3074" name="Picture 2" descr="Comment free icon">
+            <a:extLst>
+              <a:ext uri="{FF2B5EF4-FFF2-40B4-BE49-F238E27FC236}">
+                <a16:creationId xmlns:a16="http://schemas.microsoft.com/office/drawing/2014/main" id="{A6DCB89E-3268-4BE9-A1C3-CB009167E5BB}"/>
+              </a:ext>
+            </a:extLst>
+          </p:cNvPr>
+          <p:cNvPicPr>
+            <a:picLocks noChangeAspect="1" noChangeArrowheads="1"/>
+          </p:cNvPicPr>
+          <p:nvPr/>
+        </p:nvPicPr>
+        <p:blipFill>
+          <a:blip r:embed="rId7" cstate="print">
+            <a:extLst>
+              <a:ext uri="{28A0092B-C50C-407E-A947-70E740481C1C}">
+                <a14:useLocalDpi xmlns:a14="http://schemas.microsoft.com/office/drawing/2010/main" val="0"/>
+              </a:ext>
+            </a:extLst>
+          </a:blip>
+          <a:srcRect/>
+          <a:stretch>
+            <a:fillRect/>
+          </a:stretch>
+        </p:blipFill>
+        <p:spPr bwMode="auto">
+          <a:xfrm>
+            <a:off x="6733831" y="3678793"/>
+            <a:ext cx="1699199" cy="1699199"/>
+          </a:xfrm>
+          <a:prstGeom prst="rect">
+            <a:avLst/>
+          </a:prstGeom>
+          <a:noFill/>
+          <a:extLst>
+            <a:ext uri="{909E8E84-426E-40DD-AFC4-6F175D3DCCD1}">
+              <a14:hiddenFill xmlns:a14="http://schemas.microsoft.com/office/drawing/2010/main">
+                <a:solidFill>
+                  <a:srgbClr val="FFFFFF"/>
+                </a:solidFill>
+              </a14:hiddenFill>
+            </a:ext>
+          </a:extLst>
+        </p:spPr>
+      </p:pic>
     </p:spTree>
     <p:extLst>
       <p:ext uri="{BB962C8B-B14F-4D97-AF65-F5344CB8AC3E}">

</xml_diff>